<commit_message>
added session oriented responses
</commit_message>
<xml_diff>
--- a/RDFsim/presentation/RDFsim.pptx
+++ b/RDFsim/presentation/RDFsim.pptx
@@ -5,14 +5,16 @@
     <p:sldMasterId id="2147483648" r:id="rId1"/>
   </p:sldMasterIdLst>
   <p:notesMasterIdLst>
-    <p:notesMasterId r:id="rId7"/>
+    <p:notesMasterId r:id="rId9"/>
   </p:notesMasterIdLst>
   <p:sldIdLst>
     <p:sldId id="256" r:id="rId2"/>
     <p:sldId id="263" r:id="rId3"/>
-    <p:sldId id="262" r:id="rId4"/>
-    <p:sldId id="264" r:id="rId5"/>
-    <p:sldId id="265" r:id="rId6"/>
+    <p:sldId id="266" r:id="rId4"/>
+    <p:sldId id="267" r:id="rId5"/>
+    <p:sldId id="262" r:id="rId6"/>
+    <p:sldId id="264" r:id="rId7"/>
+    <p:sldId id="265" r:id="rId8"/>
   </p:sldIdLst>
   <p:sldSz cx="12192000" cy="6858000"/>
   <p:notesSz cx="6858000" cy="9144000"/>
@@ -544,6 +546,90 @@
     <p:extLst>
       <p:ext uri="{BB962C8B-B14F-4D97-AF65-F5344CB8AC3E}">
         <p14:creationId xmlns:p14="http://schemas.microsoft.com/office/powerpoint/2010/main" val="2407311993"/>
+      </p:ext>
+    </p:extLst>
+  </p:cSld>
+  <p:clrMapOvr>
+    <a:masterClrMapping/>
+  </p:clrMapOvr>
+</p:notes>
+</file>
+
+<file path=ppt/notesSlides/notesSlide2.xml><?xml version="1.0" encoding="utf-8"?>
+<p:notes xmlns:a="http://schemas.openxmlformats.org/drawingml/2006/main" xmlns:r="http://schemas.openxmlformats.org/officeDocument/2006/relationships" xmlns:p="http://schemas.openxmlformats.org/presentationml/2006/main">
+  <p:cSld>
+    <p:spTree>
+      <p:nvGrpSpPr>
+        <p:cNvPr id="1" name=""/>
+        <p:cNvGrpSpPr/>
+        <p:nvPr/>
+      </p:nvGrpSpPr>
+      <p:grpSpPr>
+        <a:xfrm>
+          <a:off x="0" y="0"/>
+          <a:ext cx="0" cy="0"/>
+          <a:chOff x="0" y="0"/>
+          <a:chExt cx="0" cy="0"/>
+        </a:xfrm>
+      </p:grpSpPr>
+      <p:sp>
+        <p:nvSpPr>
+          <p:cNvPr id="2" name="Slide Image Placeholder 1"/>
+          <p:cNvSpPr>
+            <a:spLocks noGrp="1" noRot="1" noChangeAspect="1"/>
+          </p:cNvSpPr>
+          <p:nvPr>
+            <p:ph type="sldImg"/>
+          </p:nvPr>
+        </p:nvSpPr>
+        <p:spPr/>
+      </p:sp>
+      <p:sp>
+        <p:nvSpPr>
+          <p:cNvPr id="3" name="Notes Placeholder 2"/>
+          <p:cNvSpPr>
+            <a:spLocks noGrp="1"/>
+          </p:cNvSpPr>
+          <p:nvPr>
+            <p:ph type="body" idx="1"/>
+          </p:nvPr>
+        </p:nvSpPr>
+        <p:spPr/>
+        <p:txBody>
+          <a:bodyPr/>
+          <a:lstStyle/>
+          <a:p>
+            <a:endParaRPr lang="en-US" dirty="0"/>
+          </a:p>
+        </p:txBody>
+      </p:sp>
+      <p:sp>
+        <p:nvSpPr>
+          <p:cNvPr id="4" name="Slide Number Placeholder 3"/>
+          <p:cNvSpPr>
+            <a:spLocks noGrp="1"/>
+          </p:cNvSpPr>
+          <p:nvPr>
+            <p:ph type="sldNum" sz="quarter" idx="10"/>
+          </p:nvPr>
+        </p:nvSpPr>
+        <p:spPr/>
+        <p:txBody>
+          <a:bodyPr/>
+          <a:lstStyle/>
+          <a:p>
+            <a:fld id="{9362E13B-561A-46D6-BAB1-4819B0D970EF}" type="slidenum">
+              <a:rPr lang="en-US" smtClean="0"/>
+              <a:t>3</a:t>
+            </a:fld>
+            <a:endParaRPr lang="en-US"/>
+          </a:p>
+        </p:txBody>
+      </p:sp>
+    </p:spTree>
+    <p:extLst>
+      <p:ext uri="{BB962C8B-B14F-4D97-AF65-F5344CB8AC3E}">
+        <p14:creationId xmlns:p14="http://schemas.microsoft.com/office/powerpoint/2010/main" val="3568390321"/>
       </p:ext>
     </p:extLst>
   </p:cSld>
@@ -3772,38 +3858,8 @@
         </p:nvSpPr>
         <p:spPr>
           <a:xfrm>
-            <a:off x="838200" y="483577"/>
-            <a:ext cx="10515600" cy="659423"/>
-          </a:xfrm>
-        </p:spPr>
-        <p:txBody>
-          <a:bodyPr>
-            <a:normAutofit fontScale="90000"/>
-          </a:bodyPr>
-          <a:lstStyle/>
-          <a:p>
-            <a:r>
-              <a:rPr lang="en-US" dirty="0" smtClean="0"/>
-              <a:t>Context</a:t>
-            </a:r>
-            <a:endParaRPr lang="en-US" dirty="0"/>
-          </a:p>
-        </p:txBody>
-      </p:sp>
-      <p:sp>
-        <p:nvSpPr>
-          <p:cNvPr id="3" name="Content Placeholder 2"/>
-          <p:cNvSpPr>
-            <a:spLocks noGrp="1"/>
-          </p:cNvSpPr>
-          <p:nvPr>
-            <p:ph idx="1"/>
-          </p:nvPr>
-        </p:nvSpPr>
-        <p:spPr>
-          <a:xfrm>
-            <a:off x="838200" y="1245331"/>
-            <a:ext cx="10515600" cy="5397746"/>
+            <a:off x="838200" y="718039"/>
+            <a:ext cx="10515600" cy="829408"/>
           </a:xfrm>
         </p:spPr>
         <p:txBody>
@@ -3813,184 +3869,66 @@
           <a:lstStyle/>
           <a:p>
             <a:r>
-              <a:rPr lang="en-US" sz="2000" dirty="0" smtClean="0"/>
+              <a:rPr lang="en-US" dirty="0" smtClean="0"/>
+              <a:t>Context</a:t>
+            </a:r>
+            <a:endParaRPr lang="en-US" dirty="0"/>
+          </a:p>
+        </p:txBody>
+      </p:sp>
+      <p:sp>
+        <p:nvSpPr>
+          <p:cNvPr id="3" name="Content Placeholder 2"/>
+          <p:cNvSpPr>
+            <a:spLocks noGrp="1"/>
+          </p:cNvSpPr>
+          <p:nvPr>
+            <p:ph idx="1"/>
+          </p:nvPr>
+        </p:nvSpPr>
+        <p:spPr>
+          <a:xfrm>
+            <a:off x="838200" y="1936991"/>
+            <a:ext cx="10515600" cy="3174269"/>
+          </a:xfrm>
+        </p:spPr>
+        <p:txBody>
+          <a:bodyPr>
+            <a:normAutofit/>
+          </a:bodyPr>
+          <a:lstStyle/>
+          <a:p>
+            <a:r>
+              <a:rPr lang="en-US" dirty="0" smtClean="0"/>
               <a:t>Browsing is one of the most important actions of the web.</a:t>
             </a:r>
           </a:p>
           <a:p>
             <a:r>
-              <a:rPr lang="en-US" sz="2000" dirty="0" smtClean="0"/>
-              <a:t>RDF Databases/Knowledge graph containing lots of useful information (As RDF format is really good at expressing information).</a:t>
-            </a:r>
-          </a:p>
-          <a:p>
-            <a:r>
-              <a:rPr lang="en-US" sz="2000" dirty="0" smtClean="0"/>
-              <a:t>Are there user friendly/easy ways to browse the data of an RDF database?</a:t>
-            </a:r>
-          </a:p>
-          <a:p>
-            <a:r>
-              <a:rPr lang="en-US" sz="2000" dirty="0" smtClean="0"/>
-              <a:t>Simple users are unfamiliar with the Semantic Web concepts.</a:t>
-            </a:r>
-          </a:p>
-          <a:p>
-            <a:r>
-              <a:rPr lang="en-US" sz="2000" dirty="0" smtClean="0"/>
-              <a:t>Should we explore different ways to retrieve information, considering classic I.R. (information retrieval) methods?</a:t>
-            </a:r>
-          </a:p>
-          <a:p>
-            <a:r>
-              <a:rPr lang="en-US" sz="2000" dirty="0" smtClean="0">
-                <a:solidFill>
-                  <a:srgbClr val="FF0000"/>
-                </a:solidFill>
-              </a:rPr>
-              <a:t>Background:</a:t>
-            </a:r>
-          </a:p>
-          <a:p>
-            <a:pPr lvl="1"/>
-            <a:r>
-              <a:rPr lang="en-US" sz="1800" dirty="0" smtClean="0">
-                <a:solidFill>
-                  <a:srgbClr val="FF0000"/>
-                </a:solidFill>
-              </a:rPr>
-              <a:t>Knowledge </a:t>
-            </a:r>
-            <a:r>
-              <a:rPr lang="en-US" sz="1800" dirty="0" smtClean="0">
-                <a:solidFill>
-                  <a:srgbClr val="FF0000"/>
-                </a:solidFill>
-              </a:rPr>
-              <a:t>Graph</a:t>
-            </a:r>
-            <a:r>
-              <a:rPr lang="en-US" sz="1800" dirty="0" smtClean="0">
-                <a:solidFill>
-                  <a:srgbClr val="FF0000"/>
-                </a:solidFill>
-              </a:rPr>
-              <a:t>: </a:t>
-            </a:r>
-            <a:r>
-              <a:rPr lang="en-US" sz="1800" dirty="0" smtClean="0"/>
-              <a:t>Networks that contain entities and visualize the relationships among them (e.g. Google Knowledge Graph, </a:t>
-            </a:r>
-            <a:r>
-              <a:rPr lang="en-US" sz="1800" dirty="0" err="1" smtClean="0"/>
-              <a:t>Dbpedia</a:t>
-            </a:r>
-            <a:r>
-              <a:rPr lang="en-US" sz="1800" dirty="0" smtClean="0"/>
-              <a:t> and more…)</a:t>
-            </a:r>
-            <a:endParaRPr lang="en-US" sz="1800" dirty="0" smtClean="0">
-              <a:solidFill>
-                <a:srgbClr val="FF0000"/>
-              </a:solidFill>
-            </a:endParaRPr>
-          </a:p>
-          <a:p>
-            <a:pPr lvl="1"/>
-            <a:r>
-              <a:rPr lang="en-US" sz="1800" dirty="0" smtClean="0">
-                <a:solidFill>
-                  <a:srgbClr val="FF0000"/>
-                </a:solidFill>
-              </a:rPr>
-              <a:t>RDF </a:t>
-            </a:r>
-            <a:r>
-              <a:rPr lang="en-US" sz="1800" dirty="0" smtClean="0">
-                <a:solidFill>
-                  <a:srgbClr val="FF0000"/>
-                </a:solidFill>
-              </a:rPr>
-              <a:t>Triple: </a:t>
-            </a:r>
-            <a:r>
-              <a:rPr lang="en-US" sz="1800" dirty="0" smtClean="0"/>
-              <a:t>A set of 3 entities, representing a sentence in subject-predicate-object format</a:t>
-            </a:r>
-          </a:p>
-          <a:p>
-            <a:pPr lvl="1"/>
-            <a:r>
-              <a:rPr lang="en-US" sz="1800" dirty="0" smtClean="0">
-                <a:solidFill>
-                  <a:srgbClr val="FF0000"/>
-                </a:solidFill>
-              </a:rPr>
-              <a:t>RDF Database: </a:t>
-            </a:r>
-            <a:r>
-              <a:rPr lang="en-US" sz="1800" dirty="0" smtClean="0"/>
-              <a:t>A database storing the triples of a knowledge graph</a:t>
-            </a:r>
-            <a:endParaRPr lang="en-US" sz="1800" dirty="0" smtClean="0">
-              <a:solidFill>
-                <a:srgbClr val="FF0000"/>
-              </a:solidFill>
-            </a:endParaRPr>
-          </a:p>
-          <a:p>
-            <a:pPr lvl="1"/>
-            <a:r>
-              <a:rPr lang="en-US" sz="1800" dirty="0" smtClean="0">
-                <a:solidFill>
-                  <a:srgbClr val="FF0000"/>
-                </a:solidFill>
-              </a:rPr>
-              <a:t>Natural </a:t>
-            </a:r>
-            <a:r>
-              <a:rPr lang="en-US" sz="1800" dirty="0" smtClean="0">
-                <a:solidFill>
-                  <a:srgbClr val="FF0000"/>
-                </a:solidFill>
-              </a:rPr>
-              <a:t>Language Processing (NLP): </a:t>
-            </a:r>
-            <a:r>
-              <a:rPr lang="en-US" sz="1800" dirty="0" smtClean="0"/>
-              <a:t>The branch of AI that focuses on producing methods to make computers semantically understand the text (e.g. Speech Recognition, Sentiment analysis)</a:t>
-            </a:r>
-          </a:p>
-          <a:p>
-            <a:pPr lvl="2"/>
-            <a:r>
-              <a:rPr lang="en-US" sz="1400" dirty="0" smtClean="0">
-                <a:solidFill>
-                  <a:srgbClr val="FF0000"/>
-                </a:solidFill>
-              </a:rPr>
-              <a:t>Word Embedding: </a:t>
-            </a:r>
-            <a:r>
-              <a:rPr lang="en-US" sz="1400" dirty="0" smtClean="0"/>
-              <a:t>The task of mapping words into vector representations, with the aim of semantically similar words to be placed closer on the multidimensional space (i.e. their vectors to be similar)</a:t>
-            </a:r>
-            <a:r>
-              <a:rPr lang="en-US" sz="1400" dirty="0" smtClean="0">
-                <a:solidFill>
-                  <a:srgbClr val="FF0000"/>
-                </a:solidFill>
-              </a:rPr>
-              <a:t> </a:t>
-            </a:r>
-          </a:p>
-          <a:p>
-            <a:pPr lvl="2"/>
-            <a:endParaRPr lang="en-US" sz="1400" dirty="0" smtClean="0"/>
-          </a:p>
-          <a:p>
-            <a:pPr lvl="1"/>
-            <a:endParaRPr lang="en-US" sz="1800" dirty="0">
+              <a:rPr lang="en-US" dirty="0" smtClean="0"/>
+              <a:t>RDF Databases/Knowledge graph containing lots of useful information (As RDF format is really good at expressing information</a:t>
+            </a:r>
+            <a:r>
+              <a:rPr lang="en-US" dirty="0" smtClean="0"/>
+              <a:t>).</a:t>
+            </a:r>
+          </a:p>
+          <a:p>
+            <a:r>
+              <a:rPr lang="en-US" dirty="0"/>
+              <a:t>Simple users are unfamiliar with the Semantic Web concepts</a:t>
+            </a:r>
+            <a:r>
+              <a:rPr lang="en-US" dirty="0" smtClean="0"/>
+              <a:t>.</a:t>
+            </a:r>
+            <a:endParaRPr lang="en-US" dirty="0" smtClean="0"/>
+          </a:p>
+          <a:p>
+            <a:pPr marL="457200" lvl="1" indent="0">
+              <a:buNone/>
+            </a:pPr>
+            <a:endParaRPr lang="en-US" dirty="0">
               <a:solidFill>
                 <a:srgbClr val="FF0000"/>
               </a:solidFill>
@@ -4040,27 +3978,17 @@
         </p:nvSpPr>
         <p:spPr>
           <a:xfrm>
-            <a:off x="838200" y="365126"/>
-            <a:ext cx="10515600" cy="681160"/>
+            <a:off x="517769" y="281232"/>
+            <a:ext cx="10515600" cy="1325563"/>
           </a:xfrm>
         </p:spPr>
         <p:txBody>
-          <a:bodyPr>
-            <a:normAutofit fontScale="90000"/>
-          </a:bodyPr>
+          <a:bodyPr/>
           <a:lstStyle/>
           <a:p>
             <a:r>
               <a:rPr lang="en-US" dirty="0" smtClean="0"/>
-              <a:t>What is </a:t>
-            </a:r>
-            <a:r>
-              <a:rPr lang="en-US" dirty="0" err="1" smtClean="0"/>
-              <a:t>RDFsim</a:t>
-            </a:r>
-            <a:r>
-              <a:rPr lang="en-US" dirty="0" smtClean="0"/>
-              <a:t> (and why it is useful)?</a:t>
+              <a:t>Background</a:t>
             </a:r>
             <a:endParaRPr lang="en-US" dirty="0"/>
           </a:p>
@@ -4078,148 +4006,207 @@
         </p:nvSpPr>
         <p:spPr>
           <a:xfrm>
-            <a:off x="838200" y="1046285"/>
-            <a:ext cx="10515600" cy="5539153"/>
+            <a:off x="289169" y="1606795"/>
+            <a:ext cx="11613662" cy="4629882"/>
           </a:xfrm>
         </p:spPr>
         <p:txBody>
           <a:bodyPr>
-            <a:normAutofit/>
+            <a:noAutofit/>
           </a:bodyPr>
           <a:lstStyle/>
           <a:p>
-            <a:r>
-              <a:rPr lang="en-US" sz="2200" dirty="0" err="1" smtClean="0"/>
-              <a:t>RDFsim</a:t>
-            </a:r>
-            <a:r>
-              <a:rPr lang="en-US" sz="2200" dirty="0" smtClean="0"/>
-              <a:t> is a web application designed to provide a UI for browsing </a:t>
-            </a:r>
-            <a:r>
-              <a:rPr lang="en-US" sz="2200" dirty="0" smtClean="0"/>
-              <a:t>over</a:t>
-            </a:r>
-            <a:r>
-              <a:rPr lang="en-US" sz="2200" dirty="0" smtClean="0"/>
-              <a:t> </a:t>
-            </a:r>
-            <a:r>
-              <a:rPr lang="en-US" sz="2200" dirty="0" smtClean="0"/>
-              <a:t>the data of an RDF database.</a:t>
-            </a:r>
-          </a:p>
-          <a:p>
-            <a:r>
-              <a:rPr lang="en-US" sz="2200" dirty="0" smtClean="0"/>
-              <a:t>It provides an easy and interactive way to browse over entities of a RDF DB, by showing the entities that are semantically similar to a corresponding entity, while it is able to show information about this entity (Wikipedia page, </a:t>
-            </a:r>
-            <a:r>
-              <a:rPr lang="en-US" sz="2200" dirty="0" err="1" smtClean="0"/>
-              <a:t>dbpedia</a:t>
-            </a:r>
-            <a:r>
-              <a:rPr lang="en-US" sz="2200" dirty="0" smtClean="0"/>
-              <a:t> page or raw triples).</a:t>
-            </a:r>
-          </a:p>
-          <a:p>
-            <a:r>
-              <a:rPr lang="en-US" sz="2200" dirty="0" smtClean="0"/>
-              <a:t>It can be configured to work on any RDF database (for this demo version, </a:t>
-            </a:r>
-            <a:r>
-              <a:rPr lang="en-US" sz="2200" dirty="0" err="1" smtClean="0"/>
-              <a:t>Dbpedia</a:t>
-            </a:r>
-            <a:r>
-              <a:rPr lang="en-US" sz="2200" dirty="0" smtClean="0"/>
-              <a:t> is used)</a:t>
-            </a:r>
-          </a:p>
-          <a:p>
-            <a:r>
-              <a:rPr lang="en-US" sz="2200" dirty="0" smtClean="0"/>
-              <a:t>For any given configuration, it pre-calculates the data, thus it can be run on any common machine supposing that the input dataset is provided.</a:t>
-            </a:r>
-          </a:p>
-          <a:p>
-            <a:r>
-              <a:rPr lang="en-US" sz="2200" dirty="0" smtClean="0"/>
-              <a:t>It is </a:t>
-            </a:r>
-            <a:r>
-              <a:rPr lang="en-US" sz="2200" dirty="0" err="1" smtClean="0"/>
-              <a:t>independed</a:t>
-            </a:r>
-            <a:r>
-              <a:rPr lang="en-US" sz="2200" dirty="0" smtClean="0"/>
-              <a:t> from the library that provides the methods to find the similar entities to a given one, thus it is easily refactored</a:t>
-            </a:r>
-            <a:r>
-              <a:rPr lang="en-US" sz="2200" dirty="0" smtClean="0"/>
-              <a:t>.</a:t>
-            </a:r>
-          </a:p>
-          <a:p>
-            <a:r>
-              <a:rPr lang="en-US" sz="2200" dirty="0" smtClean="0"/>
-              <a:t>It exploits the recent trend of producing word (entity) embedding over a Knowledge graph. </a:t>
-            </a:r>
-            <a:endParaRPr lang="el-GR" sz="2200" dirty="0" smtClean="0"/>
-          </a:p>
-          <a:p>
-            <a:r>
-              <a:rPr lang="en-US" sz="2200" dirty="0" smtClean="0">
+            <a:pPr marL="457200" lvl="1" indent="0">
+              <a:buNone/>
+            </a:pPr>
+            <a:r>
+              <a:rPr lang="en-US" dirty="0" smtClean="0">
                 <a:solidFill>
                   <a:srgbClr val="FF0000"/>
                 </a:solidFill>
               </a:rPr>
-              <a:t>Important: </a:t>
-            </a:r>
-            <a:r>
-              <a:rPr lang="en-US" sz="2200" dirty="0" err="1" smtClean="0">
+              <a:t>Knowledge Graph: </a:t>
+            </a:r>
+            <a:r>
+              <a:rPr lang="en-US" dirty="0" smtClean="0"/>
+              <a:t>Networks that contain entities and visualize the relationships among them (e.g. Google Knowledge Graph, </a:t>
+            </a:r>
+            <a:r>
+              <a:rPr lang="en-US" dirty="0" err="1" smtClean="0"/>
+              <a:t>Dbpedia</a:t>
+            </a:r>
+            <a:r>
+              <a:rPr lang="en-US" dirty="0" smtClean="0"/>
+              <a:t> and more…)</a:t>
+            </a:r>
+            <a:endParaRPr lang="en-US" dirty="0" smtClean="0">
+              <a:solidFill>
+                <a:srgbClr val="FF0000"/>
+              </a:solidFill>
+            </a:endParaRPr>
+          </a:p>
+          <a:p>
+            <a:pPr marL="457200" lvl="1" indent="0">
+              <a:buNone/>
+            </a:pPr>
+            <a:r>
+              <a:rPr lang="en-US" dirty="0" smtClean="0">
                 <a:solidFill>
                   <a:srgbClr val="FF0000"/>
                 </a:solidFill>
               </a:rPr>
-              <a:t>RDFsim</a:t>
-            </a:r>
-            <a:r>
-              <a:rPr lang="en-US" sz="2200" dirty="0" smtClean="0">
+              <a:t>RDF </a:t>
+            </a:r>
+            <a:r>
+              <a:rPr lang="en-US" dirty="0">
                 <a:solidFill>
                   <a:srgbClr val="FF0000"/>
                 </a:solidFill>
               </a:rPr>
-              <a:t> is </a:t>
-            </a:r>
-            <a:r>
-              <a:rPr lang="en-US" sz="2200" dirty="0" smtClean="0">
+              <a:t>Triple: </a:t>
+            </a:r>
+            <a:r>
+              <a:rPr lang="en-US" dirty="0"/>
+              <a:t>A set of 3 entities, representing a sentence in subject-predicate-object </a:t>
+            </a:r>
+            <a:r>
+              <a:rPr lang="en-US" dirty="0" smtClean="0"/>
+              <a:t>format.</a:t>
+            </a:r>
+            <a:endParaRPr lang="en-US" dirty="0" smtClean="0">
+              <a:solidFill>
+                <a:srgbClr val="FF0000"/>
+              </a:solidFill>
+            </a:endParaRPr>
+          </a:p>
+          <a:p>
+            <a:pPr marL="457200" lvl="1" indent="0">
+              <a:buNone/>
+            </a:pPr>
+            <a:r>
+              <a:rPr lang="en-US" dirty="0" smtClean="0">
                 <a:solidFill>
                   <a:srgbClr val="FF0000"/>
                 </a:solidFill>
               </a:rPr>
-              <a:t>NOT </a:t>
-            </a:r>
-            <a:r>
-              <a:rPr lang="en-US" sz="2200" dirty="0" smtClean="0">
+              <a:t>RDF </a:t>
+            </a:r>
+            <a:r>
+              <a:rPr lang="en-US" dirty="0">
                 <a:solidFill>
                   <a:srgbClr val="FF0000"/>
                 </a:solidFill>
               </a:rPr>
-              <a:t>a classic search engine i.e. it does not offer browsing over web pages, </a:t>
-            </a:r>
-            <a:r>
-              <a:rPr lang="en-US" sz="2200" dirty="0" smtClean="0"/>
-              <a:t>it offers browsing over information/entities of the database.</a:t>
-            </a:r>
+              <a:t>Database: </a:t>
+            </a:r>
+            <a:r>
+              <a:rPr lang="en-US" dirty="0"/>
+              <a:t>A database storing the triples of a knowledge </a:t>
+            </a:r>
+            <a:r>
+              <a:rPr lang="en-US" dirty="0" smtClean="0"/>
+              <a:t>graph</a:t>
+            </a:r>
+          </a:p>
+          <a:p>
+            <a:pPr marL="457200" lvl="1" indent="0">
+              <a:buNone/>
+            </a:pPr>
+            <a:r>
+              <a:rPr lang="en-US" dirty="0" smtClean="0">
+                <a:solidFill>
+                  <a:srgbClr val="FF0000"/>
+                </a:solidFill>
+              </a:rPr>
+              <a:t>Similarity-Based Browsing (SBB): </a:t>
+            </a:r>
+            <a:r>
+              <a:rPr lang="en-US" dirty="0" smtClean="0"/>
+              <a:t>A method to browse data by exploring the similar entities to a given one.</a:t>
+            </a:r>
+            <a:endParaRPr lang="en-US" dirty="0" smtClean="0">
+              <a:solidFill>
+                <a:srgbClr val="FF0000"/>
+              </a:solidFill>
+            </a:endParaRPr>
+          </a:p>
+          <a:p>
+            <a:pPr marL="457200" lvl="1" indent="0">
+              <a:buNone/>
+            </a:pPr>
+            <a:r>
+              <a:rPr lang="en-US" dirty="0" smtClean="0">
+                <a:solidFill>
+                  <a:srgbClr val="FF0000"/>
+                </a:solidFill>
+              </a:rPr>
+              <a:t>Natural </a:t>
+            </a:r>
+            <a:r>
+              <a:rPr lang="en-US" dirty="0">
+                <a:solidFill>
+                  <a:srgbClr val="FF0000"/>
+                </a:solidFill>
+              </a:rPr>
+              <a:t>Language Processing (NLP): </a:t>
+            </a:r>
+            <a:r>
+              <a:rPr lang="en-US" dirty="0"/>
+              <a:t>The branch of AI that focuses on producing methods to make computers semantically understand the text (e.g. Speech Recognition, Sentiment </a:t>
+            </a:r>
+            <a:r>
+              <a:rPr lang="en-US" dirty="0" smtClean="0"/>
+              <a:t>analysis</a:t>
+            </a:r>
+            <a:r>
+              <a:rPr lang="el-GR" dirty="0" smtClean="0"/>
+              <a:t>, </a:t>
+            </a:r>
+            <a:r>
+              <a:rPr lang="en-US" dirty="0" smtClean="0"/>
+              <a:t>Spam identification).</a:t>
+            </a:r>
+            <a:endParaRPr lang="en-US" dirty="0"/>
+          </a:p>
+          <a:p>
+            <a:pPr lvl="2"/>
+            <a:r>
+              <a:rPr lang="en-US" sz="1800" dirty="0">
+                <a:solidFill>
+                  <a:srgbClr val="FF0000"/>
+                </a:solidFill>
+              </a:rPr>
+              <a:t>Word Embedding: </a:t>
+            </a:r>
+            <a:r>
+              <a:rPr lang="en-US" sz="1800" dirty="0"/>
+              <a:t>The task of mapping words into vector representations, with the aim of semantically similar words to be placed closer on the multidimensional space (i.e. their vectors to be similar)</a:t>
+            </a:r>
+            <a:r>
+              <a:rPr lang="en-US" sz="1800" dirty="0">
+                <a:solidFill>
+                  <a:srgbClr val="FF0000"/>
+                </a:solidFill>
+              </a:rPr>
+              <a:t> </a:t>
+            </a:r>
+          </a:p>
+          <a:p>
+            <a:pPr lvl="2"/>
+            <a:endParaRPr lang="en-US" sz="1800" dirty="0"/>
+          </a:p>
+          <a:p>
+            <a:pPr marL="0" indent="0">
+              <a:buNone/>
+            </a:pPr>
+            <a:endParaRPr lang="en-US" sz="3600" dirty="0"/>
           </a:p>
         </p:txBody>
       </p:sp>
     </p:spTree>
     <p:extLst>
       <p:ext uri="{BB962C8B-B14F-4D97-AF65-F5344CB8AC3E}">
-        <p14:creationId xmlns:p14="http://schemas.microsoft.com/office/powerpoint/2010/main" val="2343729155"/>
+        <p14:creationId xmlns:p14="http://schemas.microsoft.com/office/powerpoint/2010/main" val="12316459"/>
       </p:ext>
     </p:extLst>
   </p:cSld>
@@ -4258,6 +4245,319 @@
         </p:nvSpPr>
         <p:spPr>
           <a:xfrm>
+            <a:off x="838200" y="372941"/>
+            <a:ext cx="10515600" cy="1325563"/>
+          </a:xfrm>
+        </p:spPr>
+        <p:txBody>
+          <a:bodyPr/>
+          <a:lstStyle/>
+          <a:p>
+            <a:r>
+              <a:rPr lang="en-US" dirty="0" smtClean="0"/>
+              <a:t>Motivation</a:t>
+            </a:r>
+            <a:endParaRPr lang="en-US" dirty="0"/>
+          </a:p>
+        </p:txBody>
+      </p:sp>
+      <p:sp>
+        <p:nvSpPr>
+          <p:cNvPr id="3" name="Content Placeholder 2"/>
+          <p:cNvSpPr>
+            <a:spLocks noGrp="1"/>
+          </p:cNvSpPr>
+          <p:nvPr>
+            <p:ph idx="1"/>
+          </p:nvPr>
+        </p:nvSpPr>
+        <p:spPr>
+          <a:xfrm>
+            <a:off x="838200" y="1825625"/>
+            <a:ext cx="10515600" cy="4426683"/>
+          </a:xfrm>
+        </p:spPr>
+        <p:txBody>
+          <a:bodyPr>
+            <a:normAutofit/>
+          </a:bodyPr>
+          <a:lstStyle/>
+          <a:p>
+            <a:r>
+              <a:rPr lang="en-US" dirty="0"/>
+              <a:t>Are there user friendly/easy ways to browse the data of an RDF database</a:t>
+            </a:r>
+            <a:r>
+              <a:rPr lang="en-US" dirty="0" smtClean="0"/>
+              <a:t>?</a:t>
+            </a:r>
+            <a:endParaRPr lang="en-US" dirty="0"/>
+          </a:p>
+          <a:p>
+            <a:r>
+              <a:rPr lang="en-US" dirty="0"/>
+              <a:t>Should we explore different ways to retrieve information, considering classic I.R. (information retrieval) methods</a:t>
+            </a:r>
+            <a:r>
+              <a:rPr lang="en-US" dirty="0" smtClean="0"/>
+              <a:t>?</a:t>
+            </a:r>
+          </a:p>
+          <a:p>
+            <a:r>
+              <a:rPr lang="en-US" dirty="0" smtClean="0"/>
+              <a:t>Can we develop software to easily work on any RDF database</a:t>
+            </a:r>
+            <a:r>
+              <a:rPr lang="el-GR" dirty="0" smtClean="0"/>
+              <a:t>, </a:t>
+            </a:r>
+            <a:r>
+              <a:rPr lang="en-US" dirty="0" smtClean="0"/>
+              <a:t>in order to make similarity-based browsing easily applicable to any DB?</a:t>
+            </a:r>
+          </a:p>
+          <a:p>
+            <a:r>
+              <a:rPr lang="en-US" dirty="0" smtClean="0"/>
+              <a:t>What is the best method to implement and use SBB? Is it applicable? What resources do we need?</a:t>
+            </a:r>
+            <a:endParaRPr lang="en-US" dirty="0"/>
+          </a:p>
+        </p:txBody>
+      </p:sp>
+    </p:spTree>
+    <p:extLst>
+      <p:ext uri="{BB962C8B-B14F-4D97-AF65-F5344CB8AC3E}">
+        <p14:creationId xmlns:p14="http://schemas.microsoft.com/office/powerpoint/2010/main" val="2998141869"/>
+      </p:ext>
+    </p:extLst>
+  </p:cSld>
+  <p:clrMapOvr>
+    <a:masterClrMapping/>
+  </p:clrMapOvr>
+</p:sld>
+</file>
+
+<file path=ppt/slides/slide5.xml><?xml version="1.0" encoding="utf-8"?>
+<p:sld xmlns:a="http://schemas.openxmlformats.org/drawingml/2006/main" xmlns:r="http://schemas.openxmlformats.org/officeDocument/2006/relationships" xmlns:p="http://schemas.openxmlformats.org/presentationml/2006/main">
+  <p:cSld>
+    <p:spTree>
+      <p:nvGrpSpPr>
+        <p:cNvPr id="1" name=""/>
+        <p:cNvGrpSpPr/>
+        <p:nvPr/>
+      </p:nvGrpSpPr>
+      <p:grpSpPr>
+        <a:xfrm>
+          <a:off x="0" y="0"/>
+          <a:ext cx="0" cy="0"/>
+          <a:chOff x="0" y="0"/>
+          <a:chExt cx="0" cy="0"/>
+        </a:xfrm>
+      </p:grpSpPr>
+      <p:sp>
+        <p:nvSpPr>
+          <p:cNvPr id="2" name="Title 1"/>
+          <p:cNvSpPr>
+            <a:spLocks noGrp="1"/>
+          </p:cNvSpPr>
+          <p:nvPr>
+            <p:ph type="title"/>
+          </p:nvPr>
+        </p:nvSpPr>
+        <p:spPr>
+          <a:xfrm>
+            <a:off x="838200" y="365126"/>
+            <a:ext cx="10515600" cy="681160"/>
+          </a:xfrm>
+        </p:spPr>
+        <p:txBody>
+          <a:bodyPr>
+            <a:normAutofit fontScale="90000"/>
+          </a:bodyPr>
+          <a:lstStyle/>
+          <a:p>
+            <a:r>
+              <a:rPr lang="en-US" dirty="0" smtClean="0"/>
+              <a:t>What is </a:t>
+            </a:r>
+            <a:r>
+              <a:rPr lang="en-US" dirty="0" err="1" smtClean="0"/>
+              <a:t>RDFsim</a:t>
+            </a:r>
+            <a:r>
+              <a:rPr lang="en-US" dirty="0" smtClean="0"/>
+              <a:t> (and why it is useful)?</a:t>
+            </a:r>
+            <a:endParaRPr lang="en-US" dirty="0"/>
+          </a:p>
+        </p:txBody>
+      </p:sp>
+      <p:sp>
+        <p:nvSpPr>
+          <p:cNvPr id="3" name="Content Placeholder 2"/>
+          <p:cNvSpPr>
+            <a:spLocks noGrp="1"/>
+          </p:cNvSpPr>
+          <p:nvPr>
+            <p:ph idx="1"/>
+          </p:nvPr>
+        </p:nvSpPr>
+        <p:spPr>
+          <a:xfrm>
+            <a:off x="838200" y="1046285"/>
+            <a:ext cx="10515600" cy="5539153"/>
+          </a:xfrm>
+        </p:spPr>
+        <p:txBody>
+          <a:bodyPr>
+            <a:normAutofit/>
+          </a:bodyPr>
+          <a:lstStyle/>
+          <a:p>
+            <a:r>
+              <a:rPr lang="en-US" sz="2200" dirty="0" err="1" smtClean="0"/>
+              <a:t>RDFsim</a:t>
+            </a:r>
+            <a:r>
+              <a:rPr lang="en-US" sz="2200" dirty="0" smtClean="0"/>
+              <a:t> is a web application designed to provide a UI for browsing over the data of an RDF database.</a:t>
+            </a:r>
+          </a:p>
+          <a:p>
+            <a:r>
+              <a:rPr lang="en-US" sz="2200" dirty="0" smtClean="0"/>
+              <a:t>It provides an easy and interactive way to browse over entities of a RDF DB, by showing the entities that are semantically similar to a corresponding entity, while it is able to show information about this entity (Wikipedia page, </a:t>
+            </a:r>
+            <a:r>
+              <a:rPr lang="en-US" sz="2200" dirty="0" err="1" smtClean="0"/>
+              <a:t>dbpedia</a:t>
+            </a:r>
+            <a:r>
+              <a:rPr lang="en-US" sz="2200" dirty="0" smtClean="0"/>
+              <a:t> page or raw triples).</a:t>
+            </a:r>
+          </a:p>
+          <a:p>
+            <a:r>
+              <a:rPr lang="en-US" sz="2200" dirty="0" smtClean="0"/>
+              <a:t>It can be configured to work on any RDF database (for this demo version, </a:t>
+            </a:r>
+            <a:r>
+              <a:rPr lang="en-US" sz="2200" dirty="0" err="1" smtClean="0"/>
+              <a:t>Dbpedia</a:t>
+            </a:r>
+            <a:r>
+              <a:rPr lang="en-US" sz="2200" dirty="0" smtClean="0"/>
+              <a:t> is used)</a:t>
+            </a:r>
+          </a:p>
+          <a:p>
+            <a:r>
+              <a:rPr lang="en-US" sz="2200" dirty="0" smtClean="0"/>
+              <a:t>For any given configuration, it pre-calculates the data, thus it can be run on any common machine supposing that the input dataset is provided.</a:t>
+            </a:r>
+          </a:p>
+          <a:p>
+            <a:r>
+              <a:rPr lang="en-US" sz="2200" dirty="0" smtClean="0"/>
+              <a:t>It is </a:t>
+            </a:r>
+            <a:r>
+              <a:rPr lang="en-US" sz="2200" dirty="0" err="1" smtClean="0"/>
+              <a:t>independed</a:t>
+            </a:r>
+            <a:r>
+              <a:rPr lang="en-US" sz="2200" dirty="0" smtClean="0"/>
+              <a:t> </a:t>
+            </a:r>
+            <a:r>
+              <a:rPr lang="en-US" sz="2200" dirty="0" smtClean="0"/>
+              <a:t>from the library that provides the methods to find the similar entities to a given one, thus it is easily refactored.</a:t>
+            </a:r>
+          </a:p>
+          <a:p>
+            <a:r>
+              <a:rPr lang="en-US" sz="2200" dirty="0" smtClean="0"/>
+              <a:t>It exploits the recent trend of producing word (entity) embedding over a Knowledge graph. </a:t>
+            </a:r>
+            <a:endParaRPr lang="el-GR" sz="2200" dirty="0" smtClean="0"/>
+          </a:p>
+          <a:p>
+            <a:r>
+              <a:rPr lang="en-US" sz="2200" dirty="0" smtClean="0">
+                <a:solidFill>
+                  <a:srgbClr val="FF0000"/>
+                </a:solidFill>
+              </a:rPr>
+              <a:t>Important: </a:t>
+            </a:r>
+            <a:r>
+              <a:rPr lang="en-US" sz="2200" dirty="0" err="1" smtClean="0">
+                <a:solidFill>
+                  <a:srgbClr val="FF0000"/>
+                </a:solidFill>
+              </a:rPr>
+              <a:t>RDFsim</a:t>
+            </a:r>
+            <a:r>
+              <a:rPr lang="en-US" sz="2200" dirty="0" smtClean="0">
+                <a:solidFill>
+                  <a:srgbClr val="FF0000"/>
+                </a:solidFill>
+              </a:rPr>
+              <a:t> is NOT a classic search engine i.e. it does not offer browsing over web pages, </a:t>
+            </a:r>
+            <a:r>
+              <a:rPr lang="en-US" sz="2200" dirty="0" smtClean="0"/>
+              <a:t>it offers browsing over information/entities of the database.</a:t>
+            </a:r>
+          </a:p>
+        </p:txBody>
+      </p:sp>
+    </p:spTree>
+    <p:extLst>
+      <p:ext uri="{BB962C8B-B14F-4D97-AF65-F5344CB8AC3E}">
+        <p14:creationId xmlns:p14="http://schemas.microsoft.com/office/powerpoint/2010/main" val="2343729155"/>
+      </p:ext>
+    </p:extLst>
+  </p:cSld>
+  <p:clrMapOvr>
+    <a:masterClrMapping/>
+  </p:clrMapOvr>
+</p:sld>
+</file>
+
+<file path=ppt/slides/slide6.xml><?xml version="1.0" encoding="utf-8"?>
+<p:sld xmlns:a="http://schemas.openxmlformats.org/drawingml/2006/main" xmlns:r="http://schemas.openxmlformats.org/officeDocument/2006/relationships" xmlns:p="http://schemas.openxmlformats.org/presentationml/2006/main">
+  <p:cSld>
+    <p:spTree>
+      <p:nvGrpSpPr>
+        <p:cNvPr id="1" name=""/>
+        <p:cNvGrpSpPr/>
+        <p:nvPr/>
+      </p:nvGrpSpPr>
+      <p:grpSpPr>
+        <a:xfrm>
+          <a:off x="0" y="0"/>
+          <a:ext cx="0" cy="0"/>
+          <a:chOff x="0" y="0"/>
+          <a:chExt cx="0" cy="0"/>
+        </a:xfrm>
+      </p:grpSpPr>
+      <p:sp>
+        <p:nvSpPr>
+          <p:cNvPr id="2" name="Title 1"/>
+          <p:cNvSpPr>
+            <a:spLocks noGrp="1"/>
+          </p:cNvSpPr>
+          <p:nvPr>
+            <p:ph type="title"/>
+          </p:nvPr>
+        </p:nvSpPr>
+        <p:spPr>
+          <a:xfrm>
             <a:off x="838200" y="105508"/>
             <a:ext cx="10515600" cy="817685"/>
           </a:xfrm>
@@ -4340,7 +4640,15 @@
           <a:p>
             <a:r>
               <a:rPr lang="en-US" sz="2400" dirty="0" smtClean="0"/>
-              <a:t>As these libraries exploit pre-trained neural networks, we suppose that based on the context of the input file, entities that are semantically similar will be mapped to closer vectors in out vector space. </a:t>
+              <a:t>As these libraries exploit </a:t>
+            </a:r>
+            <a:r>
+              <a:rPr lang="en-US" sz="2400" dirty="0" smtClean="0"/>
+              <a:t>pre-trained (or fine-tuned) </a:t>
+            </a:r>
+            <a:r>
+              <a:rPr lang="en-US" sz="2400" dirty="0" smtClean="0"/>
+              <a:t>neural networks, we suppose that based on the context of the input file, entities that are semantically similar will be mapped to closer vectors in out vector space. </a:t>
             </a:r>
             <a:r>
               <a:rPr lang="en-US" sz="2400" dirty="0" err="1" smtClean="0"/>
@@ -4383,7 +4691,7 @@
 </p:sld>
 </file>
 
-<file path=ppt/slides/slide5.xml><?xml version="1.0" encoding="utf-8"?>
+<file path=ppt/slides/slide7.xml><?xml version="1.0" encoding="utf-8"?>
 <p:sld xmlns:a="http://schemas.openxmlformats.org/drawingml/2006/main" xmlns:r="http://schemas.openxmlformats.org/officeDocument/2006/relationships" xmlns:p="http://schemas.openxmlformats.org/presentationml/2006/main">
   <p:cSld>
     <p:spTree>

</xml_diff>